<commit_message>
fixed error in paper
</commit_message>
<xml_diff>
--- a/Final/Derek_Lee_ECE472_Final/Final Presentation.pptx
+++ b/Final/Derek_Lee_ECE472_Final/Final Presentation.pptx
@@ -4338,29 +4338,7 @@
                 <a:ea typeface="+mn-ea"/>
                 <a:cs typeface="+mn-cs"/>
               </a:rPr>
-              <a:t> </a:t>
-            </a:r>
-            <a:r>
-              <a:rPr lang="en-US" sz="2000" kern="1200" dirty="0" err="1">
-                <a:solidFill>
-                  <a:srgbClr val="FFFFFF"/>
-                </a:solidFill>
-                <a:latin typeface="+mn-lt"/>
-                <a:ea typeface="+mn-ea"/>
-                <a:cs typeface="+mn-cs"/>
-              </a:rPr>
-              <a:t>Downsample</a:t>
-            </a:r>
-            <a:r>
-              <a:rPr lang="en-US" sz="2000" kern="1200" dirty="0">
-                <a:solidFill>
-                  <a:srgbClr val="FFFFFF"/>
-                </a:solidFill>
-                <a:latin typeface="+mn-lt"/>
-                <a:ea typeface="+mn-ea"/>
-                <a:cs typeface="+mn-cs"/>
-              </a:rPr>
-              <a:t> and Gaussian Blur</a:t>
+              <a:t> Downsample and Gaussian Blur</a:t>
             </a:r>
             <a:br>
               <a:rPr lang="en-US" sz="2000" kern="1200" dirty="0">
@@ -4403,27 +4381,8 @@
                 <a:ea typeface="+mn-ea"/>
                 <a:cs typeface="+mn-cs"/>
               </a:rPr>
-              <a:t> </a:t>
-            </a:r>
-            <a:r>
-              <a:rPr lang="en-US" sz="2000" kern="1200" dirty="0" err="1">
-                <a:solidFill>
-                  <a:srgbClr val="FFFFFF"/>
-                </a:solidFill>
-                <a:latin typeface="+mn-lt"/>
-                <a:ea typeface="+mn-ea"/>
-                <a:cs typeface="+mn-cs"/>
-              </a:rPr>
-              <a:t>Upsample</a:t>
-            </a:r>
-            <a:endParaRPr lang="en-US" sz="2000" kern="1200" dirty="0">
-              <a:solidFill>
-                <a:srgbClr val="FFFFFF"/>
-              </a:solidFill>
-              <a:latin typeface="+mn-lt"/>
-              <a:ea typeface="+mn-ea"/>
-              <a:cs typeface="+mn-cs"/>
-            </a:endParaRPr>
+              <a:t> Upsample</a:t>
+            </a:r>
           </a:p>
           <a:p>
             <a:pPr algn="ctr">
@@ -4525,7 +4484,7 @@
         </p:blipFill>
         <p:spPr>
           <a:xfrm>
-            <a:off x="5153822" y="1352220"/>
+            <a:off x="5125308" y="908570"/>
             <a:ext cx="6553545" cy="4161501"/>
           </a:xfrm>
           <a:prstGeom prst="rect">
@@ -4555,7 +4514,7 @@
         </p:blipFill>
         <p:spPr>
           <a:xfrm>
-            <a:off x="6514799" y="5787538"/>
+            <a:off x="6439736" y="5305733"/>
             <a:ext cx="4611878" cy="780729"/>
           </a:xfrm>
           <a:prstGeom prst="rect">
@@ -4577,7 +4536,7 @@
         </p:nvSpPr>
         <p:spPr>
           <a:xfrm rot="10800000">
-            <a:off x="8089218" y="5187696"/>
+            <a:off x="8089217" y="4750968"/>
             <a:ext cx="312863" cy="508402"/>
           </a:xfrm>
           <a:prstGeom prst="downArrow">
@@ -4605,10 +4564,40 @@
           <a:lstStyle/>
           <a:p>
             <a:pPr algn="ctr"/>
-            <a:endParaRPr lang="en-US"/>
-          </a:p>
-        </p:txBody>
-      </p:sp>
+            <a:endParaRPr lang="en-US" dirty="0"/>
+          </a:p>
+        </p:txBody>
+      </p:sp>
+      <p:pic>
+        <p:nvPicPr>
+          <p:cNvPr id="4" name="Picture 3">
+            <a:extLst>
+              <a:ext uri="{FF2B5EF4-FFF2-40B4-BE49-F238E27FC236}">
+                <a16:creationId xmlns:a16="http://schemas.microsoft.com/office/drawing/2014/main" id="{4363D202-8FEF-4AC8-8E13-63A32E89B52C}"/>
+              </a:ext>
+            </a:extLst>
+          </p:cNvPr>
+          <p:cNvPicPr>
+            <a:picLocks noChangeAspect="1"/>
+          </p:cNvPicPr>
+          <p:nvPr/>
+        </p:nvPicPr>
+        <p:blipFill>
+          <a:blip r:embed="rId4"/>
+          <a:stretch>
+            <a:fillRect/>
+          </a:stretch>
+        </p:blipFill>
+        <p:spPr>
+          <a:xfrm>
+            <a:off x="6541094" y="5974937"/>
+            <a:ext cx="4618547" cy="694374"/>
+          </a:xfrm>
+          <a:prstGeom prst="rect">
+            <a:avLst/>
+          </a:prstGeom>
+        </p:spPr>
+      </p:pic>
     </p:spTree>
     <p:extLst>
       <p:ext uri="{BB962C8B-B14F-4D97-AF65-F5344CB8AC3E}">

</xml_diff>